<commit_message>
Clean out possible prorietary content
</commit_message>
<xml_diff>
--- a/testing_debug/submit_PythonistsaCafe_SO/0123-45-67.pptx
+++ b/testing_debug/submit_PythonistsaCafe_SO/0123-45-67.pptx
@@ -148,10 +148,10 @@
       </p14:sectionLst>
     </p:ext>
     <p:ext uri="{EFAFB233-063F-42B5-8137-9DF3F51BA10A}">
-      <p15:sldGuideLst xmlns="" xmlns:p15="http://schemas.microsoft.com/office/powerpoint/2012/main"/>
+      <p15:sldGuideLst xmlns:p15="http://schemas.microsoft.com/office/powerpoint/2012/main" xmlns=""/>
     </p:ext>
     <p:ext uri="{2D200454-40CA-4A62-9FC3-DE9A4176ACB9}">
-      <p15:notesGuideLst xmlns="" xmlns:p15="http://schemas.microsoft.com/office/powerpoint/2012/main">
+      <p15:notesGuideLst xmlns:p15="http://schemas.microsoft.com/office/powerpoint/2012/main" xmlns="">
         <p15:guide id="1" orient="horz" pos="2880">
           <p15:clr>
             <a:srgbClr val="A4A3A4"/>
@@ -281,7 +281,7 @@
           <a:p>
             <a:fld id="{C5B2B270-A8A7-42FD-967D-BBF63E114749}" type="datetimeFigureOut">
               <a:rPr lang="en-US" smtClean="0"/>
-              <a:t>10/15/2019</a:t>
+              <a:t>10/16/2019</a:t>
             </a:fld>
             <a:endParaRPr lang="en-US" dirty="0"/>
           </a:p>
@@ -446,7 +446,7 @@
           <a:p>
             <a:fld id="{F4690FCF-3638-4291-9812-0F33EF9EA4FD}" type="datetimeFigureOut">
               <a:rPr lang="en-US" smtClean="0"/>
-              <a:t>10/15/2019</a:t>
+              <a:t>10/16/2019</a:t>
             </a:fld>
             <a:endParaRPr lang="en-US" dirty="0"/>
           </a:p>
@@ -4238,23 +4238,147 @@
           </a:p>
           <a:p>
             <a:r>
-              <a:rPr lang="en-US" sz="1100" b="1" dirty="0"/>
+              <a:rPr lang="en-US" sz="1100" b="1" dirty="0" smtClean="0"/>
               <a:t>Hint Audio: </a:t>
             </a:r>
             <a:r>
-              <a:rPr lang="en-US" sz="1100" b="0" dirty="0"/>
-              <a:t>The null hypothesis is a statement that the parameter of interest is equal to the claimed value. The alternative</a:t>
-            </a:r>
-            <a:r>
-              <a:rPr lang="en-US" sz="1100" b="0" baseline="0" dirty="0"/>
-              <a:t> hypothesis</a:t>
-            </a:r>
-            <a:r>
-              <a:rPr lang="en-US" sz="1100" b="0" dirty="0"/>
-              <a:t> is what we believe we have evidence for and will contain either a less-than sign, a greater-than sign, or a not-equal-to sign.</a:t>
-            </a:r>
-            <a:r>
-              <a:rPr lang="en-US" sz="1100" kern="1200" dirty="0">
+              <a:rPr lang="en-US" sz="1100" b="0" dirty="0" err="1" smtClean="0"/>
+              <a:t>Sed</a:t>
+            </a:r>
+            <a:r>
+              <a:rPr lang="en-US" sz="1100" b="0" dirty="0" smtClean="0"/>
+              <a:t> </a:t>
+            </a:r>
+            <a:r>
+              <a:rPr lang="en-US" sz="1100" b="0" dirty="0" err="1" smtClean="0"/>
+              <a:t>fringilla</a:t>
+            </a:r>
+            <a:r>
+              <a:rPr lang="en-US" sz="1100" b="0" dirty="0" smtClean="0"/>
+              <a:t> </a:t>
+            </a:r>
+            <a:r>
+              <a:rPr lang="en-US" sz="1100" b="0" dirty="0" err="1" smtClean="0"/>
+              <a:t>mauris</a:t>
+            </a:r>
+            <a:r>
+              <a:rPr lang="en-US" sz="1100" b="0" dirty="0" smtClean="0"/>
+              <a:t> sit </a:t>
+            </a:r>
+            <a:r>
+              <a:rPr lang="en-US" sz="1100" b="0" dirty="0" err="1" smtClean="0"/>
+              <a:t>amet</a:t>
+            </a:r>
+            <a:r>
+              <a:rPr lang="en-US" sz="1100" b="0" dirty="0" smtClean="0"/>
+              <a:t> </a:t>
+            </a:r>
+            <a:r>
+              <a:rPr lang="en-US" sz="1100" b="0" dirty="0" err="1" smtClean="0"/>
+              <a:t>nibh</a:t>
+            </a:r>
+            <a:r>
+              <a:rPr lang="en-US" sz="1100" b="0" dirty="0" smtClean="0"/>
+              <a:t>. </a:t>
+            </a:r>
+            <a:r>
+              <a:rPr lang="en-US" sz="1100" b="0" dirty="0" err="1" smtClean="0"/>
+              <a:t>Donec</a:t>
+            </a:r>
+            <a:r>
+              <a:rPr lang="en-US" sz="1100" b="0" dirty="0" smtClean="0"/>
+              <a:t> </a:t>
+            </a:r>
+            <a:r>
+              <a:rPr lang="en-US" sz="1100" b="0" dirty="0" err="1" smtClean="0"/>
+              <a:t>sodales</a:t>
+            </a:r>
+            <a:r>
+              <a:rPr lang="en-US" sz="1100" b="0" dirty="0" smtClean="0"/>
+              <a:t> </a:t>
+            </a:r>
+            <a:r>
+              <a:rPr lang="en-US" sz="1100" b="0" dirty="0" err="1" smtClean="0"/>
+              <a:t>sagittis</a:t>
+            </a:r>
+            <a:r>
+              <a:rPr lang="en-US" sz="1100" b="0" dirty="0" smtClean="0"/>
+              <a:t> magna. </a:t>
+            </a:r>
+            <a:r>
+              <a:rPr lang="en-US" sz="1100" b="0" dirty="0" err="1" smtClean="0"/>
+              <a:t>Sed</a:t>
+            </a:r>
+            <a:r>
+              <a:rPr lang="en-US" sz="1100" b="0" dirty="0" smtClean="0"/>
+              <a:t> </a:t>
+            </a:r>
+            <a:r>
+              <a:rPr lang="en-US" sz="1100" b="0" dirty="0" err="1" smtClean="0"/>
+              <a:t>consequat</a:t>
+            </a:r>
+            <a:r>
+              <a:rPr lang="en-US" sz="1100" b="0" dirty="0" smtClean="0"/>
+              <a:t>, </a:t>
+            </a:r>
+            <a:r>
+              <a:rPr lang="en-US" sz="1100" b="0" dirty="0" err="1" smtClean="0"/>
+              <a:t>leo</a:t>
+            </a:r>
+            <a:r>
+              <a:rPr lang="en-US" sz="1100" b="0" dirty="0" smtClean="0"/>
+              <a:t> </a:t>
+            </a:r>
+            <a:r>
+              <a:rPr lang="en-US" sz="1100" b="0" dirty="0" err="1" smtClean="0"/>
+              <a:t>eget</a:t>
+            </a:r>
+            <a:r>
+              <a:rPr lang="en-US" sz="1100" b="0" dirty="0" smtClean="0"/>
+              <a:t> </a:t>
+            </a:r>
+            <a:r>
+              <a:rPr lang="en-US" sz="1100" b="0" dirty="0" err="1" smtClean="0"/>
+              <a:t>bibendum</a:t>
+            </a:r>
+            <a:r>
+              <a:rPr lang="en-US" sz="1100" b="0" dirty="0" smtClean="0"/>
+              <a:t> </a:t>
+            </a:r>
+            <a:r>
+              <a:rPr lang="en-US" sz="1100" b="0" dirty="0" err="1" smtClean="0"/>
+              <a:t>sodales</a:t>
+            </a:r>
+            <a:r>
+              <a:rPr lang="en-US" sz="1100" b="0" dirty="0" smtClean="0"/>
+              <a:t>, </a:t>
+            </a:r>
+            <a:r>
+              <a:rPr lang="en-US" sz="1100" b="0" dirty="0" err="1" smtClean="0"/>
+              <a:t>augue</a:t>
+            </a:r>
+            <a:r>
+              <a:rPr lang="en-US" sz="1100" b="0" dirty="0" smtClean="0"/>
+              <a:t> </a:t>
+            </a:r>
+            <a:r>
+              <a:rPr lang="en-US" sz="1100" b="0" dirty="0" err="1" smtClean="0"/>
+              <a:t>velit</a:t>
+            </a:r>
+            <a:r>
+              <a:rPr lang="en-US" sz="1100" b="0" dirty="0" smtClean="0"/>
+              <a:t> cursus </a:t>
+            </a:r>
+            <a:r>
+              <a:rPr lang="en-US" sz="1100" b="0" dirty="0" err="1" smtClean="0"/>
+              <a:t>nunc</a:t>
+            </a:r>
+            <a:r>
+              <a:rPr lang="en-US" sz="1100" b="0" dirty="0" smtClean="0"/>
+              <a:t>.</a:t>
+            </a:r>
+            <a:r>
+              <a:rPr lang="en-US" sz="1100" kern="1200" dirty="0" smtClean="0">
                 <a:solidFill>
                   <a:schemeClr val="tx1"/>
                 </a:solidFill>
@@ -4265,6 +4389,15 @@
               </a:rPr>
               <a:t> </a:t>
             </a:r>
+            <a:endParaRPr lang="en-US" sz="1100" kern="1200" dirty="0">
+              <a:solidFill>
+                <a:schemeClr val="tx1"/>
+              </a:solidFill>
+              <a:effectLst/>
+              <a:latin typeface="+mn-lt"/>
+              <a:ea typeface="+mn-ea"/>
+              <a:cs typeface="+mn-cs"/>
+            </a:endParaRPr>
           </a:p>
         </p:txBody>
       </p:sp>
@@ -22450,7 +22583,7 @@
   </p:txStyles>
   <p:extLst>
     <p:ext uri="{27BBF7A9-308A-43DC-89C8-2F10F3537804}">
-      <p15:sldGuideLst xmlns="" xmlns:p15="http://schemas.microsoft.com/office/powerpoint/2012/main">
+      <p15:sldGuideLst xmlns:p15="http://schemas.microsoft.com/office/powerpoint/2012/main" xmlns="">
         <p15:guide id="1" pos="1638" userDrawn="1">
           <p15:clr>
             <a:srgbClr val="F26B43"/>
@@ -23150,7 +23283,7 @@
   </p:txStyles>
   <p:extLst>
     <p:ext uri="{27BBF7A9-308A-43DC-89C8-2F10F3537804}">
-      <p15:sldGuideLst xmlns="" xmlns:p15="http://schemas.microsoft.com/office/powerpoint/2012/main">
+      <p15:sldGuideLst xmlns:p15="http://schemas.microsoft.com/office/powerpoint/2012/main" xmlns="">
         <p15:guide id="1" pos="1638" userDrawn="1">
           <p15:clr>
             <a:srgbClr val="F26B43"/>
@@ -23905,7 +24038,7 @@
   </p:txStyles>
   <p:extLst>
     <p:ext uri="{27BBF7A9-308A-43DC-89C8-2F10F3537804}">
-      <p15:sldGuideLst xmlns="" xmlns:p15="http://schemas.microsoft.com/office/powerpoint/2012/main">
+      <p15:sldGuideLst xmlns:p15="http://schemas.microsoft.com/office/powerpoint/2012/main" xmlns="">
         <p15:guide id="1" pos="1638" userDrawn="1">
           <p15:clr>
             <a:srgbClr val="F26B43"/>
@@ -25377,7 +25510,7 @@
   </p:txStyles>
   <p:extLst>
     <p:ext uri="{27BBF7A9-308A-43DC-89C8-2F10F3537804}">
-      <p15:sldGuideLst xmlns:p15="http://schemas.microsoft.com/office/powerpoint/2012/main" xmlns="">
+      <p15:sldGuideLst xmlns="" xmlns:p15="http://schemas.microsoft.com/office/powerpoint/2012/main">
         <p15:guide id="1" pos="1638" userDrawn="1">
           <p15:clr>
             <a:srgbClr val="F26B43"/>
@@ -26183,21 +26316,21 @@
                 <a:gridCol w="786177">
                   <a:extLst>
                     <a:ext uri="{9D8B030D-6E8A-4147-A177-3AD203B41FA5}">
-                      <a16:colId xmlns="" xmlns:a16="http://schemas.microsoft.com/office/drawing/2014/main" val="20000"/>
+                      <a16:colId xmlns:a16="http://schemas.microsoft.com/office/drawing/2014/main" xmlns="" val="20000"/>
                     </a:ext>
                   </a:extLst>
                 </a:gridCol>
                 <a:gridCol w="486538">
                   <a:extLst>
                     <a:ext uri="{9D8B030D-6E8A-4147-A177-3AD203B41FA5}">
-                      <a16:colId xmlns="" xmlns:a16="http://schemas.microsoft.com/office/drawing/2014/main" val="20001"/>
+                      <a16:colId xmlns:a16="http://schemas.microsoft.com/office/drawing/2014/main" xmlns="" val="20001"/>
                     </a:ext>
                   </a:extLst>
                 </a:gridCol>
                 <a:gridCol w="1194130">
                   <a:extLst>
                     <a:ext uri="{9D8B030D-6E8A-4147-A177-3AD203B41FA5}">
-                      <a16:colId xmlns="" xmlns:a16="http://schemas.microsoft.com/office/drawing/2014/main" val="20002"/>
+                      <a16:colId xmlns:a16="http://schemas.microsoft.com/office/drawing/2014/main" xmlns="" val="20002"/>
                     </a:ext>
                   </a:extLst>
                 </a:gridCol>
@@ -26402,7 +26535,7 @@
                 </a:tc>
                 <a:extLst>
                   <a:ext uri="{0D108BD9-81ED-4DB2-BD59-A6C34878D82A}">
-                    <a16:rowId xmlns="" xmlns:a16="http://schemas.microsoft.com/office/drawing/2014/main" val="10000"/>
+                    <a16:rowId xmlns:a16="http://schemas.microsoft.com/office/drawing/2014/main" xmlns="" val="10000"/>
                   </a:ext>
                 </a:extLst>
               </a:tr>
@@ -26553,7 +26686,7 @@
                 </a:tc>
                 <a:extLst>
                   <a:ext uri="{0D108BD9-81ED-4DB2-BD59-A6C34878D82A}">
-                    <a16:rowId xmlns="" xmlns:a16="http://schemas.microsoft.com/office/drawing/2014/main" val="10001"/>
+                    <a16:rowId xmlns:a16="http://schemas.microsoft.com/office/drawing/2014/main" xmlns="" val="10001"/>
                   </a:ext>
                 </a:extLst>
               </a:tr>
@@ -26704,7 +26837,7 @@
                 </a:tc>
                 <a:extLst>
                   <a:ext uri="{0D108BD9-81ED-4DB2-BD59-A6C34878D82A}">
-                    <a16:rowId xmlns="" xmlns:a16="http://schemas.microsoft.com/office/drawing/2014/main" val="10002"/>
+                    <a16:rowId xmlns:a16="http://schemas.microsoft.com/office/drawing/2014/main" xmlns="" val="10002"/>
                   </a:ext>
                 </a:extLst>
               </a:tr>
@@ -26855,7 +26988,7 @@
                 </a:tc>
                 <a:extLst>
                   <a:ext uri="{0D108BD9-81ED-4DB2-BD59-A6C34878D82A}">
-                    <a16:rowId xmlns="" xmlns:a16="http://schemas.microsoft.com/office/drawing/2014/main" val="10003"/>
+                    <a16:rowId xmlns:a16="http://schemas.microsoft.com/office/drawing/2014/main" xmlns="" val="10003"/>
                   </a:ext>
                 </a:extLst>
               </a:tr>
@@ -27006,7 +27139,7 @@
                 </a:tc>
                 <a:extLst>
                   <a:ext uri="{0D108BD9-81ED-4DB2-BD59-A6C34878D82A}">
-                    <a16:rowId xmlns="" xmlns:a16="http://schemas.microsoft.com/office/drawing/2014/main" val="10004"/>
+                    <a16:rowId xmlns:a16="http://schemas.microsoft.com/office/drawing/2014/main" xmlns="" val="10004"/>
                   </a:ext>
                 </a:extLst>
               </a:tr>
@@ -27157,7 +27290,7 @@
                 </a:tc>
                 <a:extLst>
                   <a:ext uri="{0D108BD9-81ED-4DB2-BD59-A6C34878D82A}">
-                    <a16:rowId xmlns="" xmlns:a16="http://schemas.microsoft.com/office/drawing/2014/main" val="10005"/>
+                    <a16:rowId xmlns:a16="http://schemas.microsoft.com/office/drawing/2014/main" xmlns="" val="10005"/>
                   </a:ext>
                 </a:extLst>
               </a:tr>
@@ -27308,7 +27441,7 @@
                 </a:tc>
                 <a:extLst>
                   <a:ext uri="{0D108BD9-81ED-4DB2-BD59-A6C34878D82A}">
-                    <a16:rowId xmlns="" xmlns:a16="http://schemas.microsoft.com/office/drawing/2014/main" val="10006"/>
+                    <a16:rowId xmlns:a16="http://schemas.microsoft.com/office/drawing/2014/main" xmlns="" val="10006"/>
                   </a:ext>
                 </a:extLst>
               </a:tr>
@@ -27459,7 +27592,7 @@
                 </a:tc>
                 <a:extLst>
                   <a:ext uri="{0D108BD9-81ED-4DB2-BD59-A6C34878D82A}">
-                    <a16:rowId xmlns="" xmlns:a16="http://schemas.microsoft.com/office/drawing/2014/main" val="10007"/>
+                    <a16:rowId xmlns:a16="http://schemas.microsoft.com/office/drawing/2014/main" xmlns="" val="10007"/>
                   </a:ext>
                 </a:extLst>
               </a:tr>
@@ -27610,7 +27743,7 @@
                 </a:tc>
                 <a:extLst>
                   <a:ext uri="{0D108BD9-81ED-4DB2-BD59-A6C34878D82A}">
-                    <a16:rowId xmlns="" xmlns:a16="http://schemas.microsoft.com/office/drawing/2014/main" val="10008"/>
+                    <a16:rowId xmlns:a16="http://schemas.microsoft.com/office/drawing/2014/main" xmlns="" val="10008"/>
                   </a:ext>
                 </a:extLst>
               </a:tr>
@@ -27761,7 +27894,7 @@
                 </a:tc>
                 <a:extLst>
                   <a:ext uri="{0D108BD9-81ED-4DB2-BD59-A6C34878D82A}">
-                    <a16:rowId xmlns="" xmlns:a16="http://schemas.microsoft.com/office/drawing/2014/main" val="10009"/>
+                    <a16:rowId xmlns:a16="http://schemas.microsoft.com/office/drawing/2014/main" xmlns="" val="10009"/>
                   </a:ext>
                 </a:extLst>
               </a:tr>
@@ -27912,7 +28045,7 @@
                 </a:tc>
                 <a:extLst>
                   <a:ext uri="{0D108BD9-81ED-4DB2-BD59-A6C34878D82A}">
-                    <a16:rowId xmlns="" xmlns:a16="http://schemas.microsoft.com/office/drawing/2014/main" val="10010"/>
+                    <a16:rowId xmlns:a16="http://schemas.microsoft.com/office/drawing/2014/main" xmlns="" val="10010"/>
                   </a:ext>
                 </a:extLst>
               </a:tr>
@@ -28063,7 +28196,7 @@
                 </a:tc>
                 <a:extLst>
                   <a:ext uri="{0D108BD9-81ED-4DB2-BD59-A6C34878D82A}">
-                    <a16:rowId xmlns="" xmlns:a16="http://schemas.microsoft.com/office/drawing/2014/main" val="10011"/>
+                    <a16:rowId xmlns:a16="http://schemas.microsoft.com/office/drawing/2014/main" xmlns="" val="10011"/>
                   </a:ext>
                 </a:extLst>
               </a:tr>
@@ -28214,7 +28347,7 @@
                 </a:tc>
                 <a:extLst>
                   <a:ext uri="{0D108BD9-81ED-4DB2-BD59-A6C34878D82A}">
-                    <a16:rowId xmlns="" xmlns:a16="http://schemas.microsoft.com/office/drawing/2014/main" val="10012"/>
+                    <a16:rowId xmlns:a16="http://schemas.microsoft.com/office/drawing/2014/main" xmlns="" val="10012"/>
                   </a:ext>
                 </a:extLst>
               </a:tr>
@@ -28365,7 +28498,7 @@
                 </a:tc>
                 <a:extLst>
                   <a:ext uri="{0D108BD9-81ED-4DB2-BD59-A6C34878D82A}">
-                    <a16:rowId xmlns="" xmlns:a16="http://schemas.microsoft.com/office/drawing/2014/main" val="10013"/>
+                    <a16:rowId xmlns:a16="http://schemas.microsoft.com/office/drawing/2014/main" xmlns="" val="10013"/>
                   </a:ext>
                 </a:extLst>
               </a:tr>
@@ -28516,7 +28649,7 @@
                 </a:tc>
                 <a:extLst>
                   <a:ext uri="{0D108BD9-81ED-4DB2-BD59-A6C34878D82A}">
-                    <a16:rowId xmlns="" xmlns:a16="http://schemas.microsoft.com/office/drawing/2014/main" val="10014"/>
+                    <a16:rowId xmlns:a16="http://schemas.microsoft.com/office/drawing/2014/main" xmlns="" val="10014"/>
                   </a:ext>
                 </a:extLst>
               </a:tr>
@@ -28667,7 +28800,7 @@
                 </a:tc>
                 <a:extLst>
                   <a:ext uri="{0D108BD9-81ED-4DB2-BD59-A6C34878D82A}">
-                    <a16:rowId xmlns="" xmlns:a16="http://schemas.microsoft.com/office/drawing/2014/main" val="10015"/>
+                    <a16:rowId xmlns:a16="http://schemas.microsoft.com/office/drawing/2014/main" xmlns="" val="10015"/>
                   </a:ext>
                 </a:extLst>
               </a:tr>
@@ -28703,21 +28836,21 @@
                 <a:gridCol w="786177">
                   <a:extLst>
                     <a:ext uri="{9D8B030D-6E8A-4147-A177-3AD203B41FA5}">
-                      <a16:colId xmlns="" xmlns:a16="http://schemas.microsoft.com/office/drawing/2014/main" val="20000"/>
+                      <a16:colId xmlns:a16="http://schemas.microsoft.com/office/drawing/2014/main" xmlns="" val="20000"/>
                     </a:ext>
                   </a:extLst>
                 </a:gridCol>
                 <a:gridCol w="486538">
                   <a:extLst>
                     <a:ext uri="{9D8B030D-6E8A-4147-A177-3AD203B41FA5}">
-                      <a16:colId xmlns="" xmlns:a16="http://schemas.microsoft.com/office/drawing/2014/main" val="20001"/>
+                      <a16:colId xmlns:a16="http://schemas.microsoft.com/office/drawing/2014/main" xmlns="" val="20001"/>
                     </a:ext>
                   </a:extLst>
                 </a:gridCol>
                 <a:gridCol w="1194130">
                   <a:extLst>
                     <a:ext uri="{9D8B030D-6E8A-4147-A177-3AD203B41FA5}">
-                      <a16:colId xmlns="" xmlns:a16="http://schemas.microsoft.com/office/drawing/2014/main" val="20002"/>
+                      <a16:colId xmlns:a16="http://schemas.microsoft.com/office/drawing/2014/main" xmlns="" val="20002"/>
                     </a:ext>
                   </a:extLst>
                 </a:gridCol>
@@ -28922,7 +29055,7 @@
                 </a:tc>
                 <a:extLst>
                   <a:ext uri="{0D108BD9-81ED-4DB2-BD59-A6C34878D82A}">
-                    <a16:rowId xmlns="" xmlns:a16="http://schemas.microsoft.com/office/drawing/2014/main" val="10000"/>
+                    <a16:rowId xmlns:a16="http://schemas.microsoft.com/office/drawing/2014/main" xmlns="" val="10000"/>
                   </a:ext>
                 </a:extLst>
               </a:tr>
@@ -29073,7 +29206,7 @@
                 </a:tc>
                 <a:extLst>
                   <a:ext uri="{0D108BD9-81ED-4DB2-BD59-A6C34878D82A}">
-                    <a16:rowId xmlns="" xmlns:a16="http://schemas.microsoft.com/office/drawing/2014/main" val="10001"/>
+                    <a16:rowId xmlns:a16="http://schemas.microsoft.com/office/drawing/2014/main" xmlns="" val="10001"/>
                   </a:ext>
                 </a:extLst>
               </a:tr>
@@ -29224,7 +29357,7 @@
                 </a:tc>
                 <a:extLst>
                   <a:ext uri="{0D108BD9-81ED-4DB2-BD59-A6C34878D82A}">
-                    <a16:rowId xmlns="" xmlns:a16="http://schemas.microsoft.com/office/drawing/2014/main" val="10002"/>
+                    <a16:rowId xmlns:a16="http://schemas.microsoft.com/office/drawing/2014/main" xmlns="" val="10002"/>
                   </a:ext>
                 </a:extLst>
               </a:tr>
@@ -29375,7 +29508,7 @@
                 </a:tc>
                 <a:extLst>
                   <a:ext uri="{0D108BD9-81ED-4DB2-BD59-A6C34878D82A}">
-                    <a16:rowId xmlns="" xmlns:a16="http://schemas.microsoft.com/office/drawing/2014/main" val="10003"/>
+                    <a16:rowId xmlns:a16="http://schemas.microsoft.com/office/drawing/2014/main" xmlns="" val="10003"/>
                   </a:ext>
                 </a:extLst>
               </a:tr>
@@ -29526,7 +29659,7 @@
                 </a:tc>
                 <a:extLst>
                   <a:ext uri="{0D108BD9-81ED-4DB2-BD59-A6C34878D82A}">
-                    <a16:rowId xmlns="" xmlns:a16="http://schemas.microsoft.com/office/drawing/2014/main" val="10004"/>
+                    <a16:rowId xmlns:a16="http://schemas.microsoft.com/office/drawing/2014/main" xmlns="" val="10004"/>
                   </a:ext>
                 </a:extLst>
               </a:tr>
@@ -29677,7 +29810,7 @@
                 </a:tc>
                 <a:extLst>
                   <a:ext uri="{0D108BD9-81ED-4DB2-BD59-A6C34878D82A}">
-                    <a16:rowId xmlns="" xmlns:a16="http://schemas.microsoft.com/office/drawing/2014/main" val="10005"/>
+                    <a16:rowId xmlns:a16="http://schemas.microsoft.com/office/drawing/2014/main" xmlns="" val="10005"/>
                   </a:ext>
                 </a:extLst>
               </a:tr>
@@ -29828,7 +29961,7 @@
                 </a:tc>
                 <a:extLst>
                   <a:ext uri="{0D108BD9-81ED-4DB2-BD59-A6C34878D82A}">
-                    <a16:rowId xmlns="" xmlns:a16="http://schemas.microsoft.com/office/drawing/2014/main" val="10006"/>
+                    <a16:rowId xmlns:a16="http://schemas.microsoft.com/office/drawing/2014/main" xmlns="" val="10006"/>
                   </a:ext>
                 </a:extLst>
               </a:tr>
@@ -29979,7 +30112,7 @@
                 </a:tc>
                 <a:extLst>
                   <a:ext uri="{0D108BD9-81ED-4DB2-BD59-A6C34878D82A}">
-                    <a16:rowId xmlns="" xmlns:a16="http://schemas.microsoft.com/office/drawing/2014/main" val="10007"/>
+                    <a16:rowId xmlns:a16="http://schemas.microsoft.com/office/drawing/2014/main" xmlns="" val="10007"/>
                   </a:ext>
                 </a:extLst>
               </a:tr>
@@ -30130,7 +30263,7 @@
                 </a:tc>
                 <a:extLst>
                   <a:ext uri="{0D108BD9-81ED-4DB2-BD59-A6C34878D82A}">
-                    <a16:rowId xmlns="" xmlns:a16="http://schemas.microsoft.com/office/drawing/2014/main" val="10008"/>
+                    <a16:rowId xmlns:a16="http://schemas.microsoft.com/office/drawing/2014/main" xmlns="" val="10008"/>
                   </a:ext>
                 </a:extLst>
               </a:tr>
@@ -30281,7 +30414,7 @@
                 </a:tc>
                 <a:extLst>
                   <a:ext uri="{0D108BD9-81ED-4DB2-BD59-A6C34878D82A}">
-                    <a16:rowId xmlns="" xmlns:a16="http://schemas.microsoft.com/office/drawing/2014/main" val="10009"/>
+                    <a16:rowId xmlns:a16="http://schemas.microsoft.com/office/drawing/2014/main" xmlns="" val="10009"/>
                   </a:ext>
                 </a:extLst>
               </a:tr>
@@ -30432,7 +30565,7 @@
                 </a:tc>
                 <a:extLst>
                   <a:ext uri="{0D108BD9-81ED-4DB2-BD59-A6C34878D82A}">
-                    <a16:rowId xmlns="" xmlns:a16="http://schemas.microsoft.com/office/drawing/2014/main" val="10010"/>
+                    <a16:rowId xmlns:a16="http://schemas.microsoft.com/office/drawing/2014/main" xmlns="" val="10010"/>
                   </a:ext>
                 </a:extLst>
               </a:tr>
@@ -30583,7 +30716,7 @@
                 </a:tc>
                 <a:extLst>
                   <a:ext uri="{0D108BD9-81ED-4DB2-BD59-A6C34878D82A}">
-                    <a16:rowId xmlns="" xmlns:a16="http://schemas.microsoft.com/office/drawing/2014/main" val="10011"/>
+                    <a16:rowId xmlns:a16="http://schemas.microsoft.com/office/drawing/2014/main" xmlns="" val="10011"/>
                   </a:ext>
                 </a:extLst>
               </a:tr>
@@ -30734,7 +30867,7 @@
                 </a:tc>
                 <a:extLst>
                   <a:ext uri="{0D108BD9-81ED-4DB2-BD59-A6C34878D82A}">
-                    <a16:rowId xmlns="" xmlns:a16="http://schemas.microsoft.com/office/drawing/2014/main" val="10012"/>
+                    <a16:rowId xmlns:a16="http://schemas.microsoft.com/office/drawing/2014/main" xmlns="" val="10012"/>
                   </a:ext>
                 </a:extLst>
               </a:tr>
@@ -30885,7 +31018,7 @@
                 </a:tc>
                 <a:extLst>
                   <a:ext uri="{0D108BD9-81ED-4DB2-BD59-A6C34878D82A}">
-                    <a16:rowId xmlns="" xmlns:a16="http://schemas.microsoft.com/office/drawing/2014/main" val="10013"/>
+                    <a16:rowId xmlns:a16="http://schemas.microsoft.com/office/drawing/2014/main" xmlns="" val="10013"/>
                   </a:ext>
                 </a:extLst>
               </a:tr>
@@ -31036,7 +31169,7 @@
                 </a:tc>
                 <a:extLst>
                   <a:ext uri="{0D108BD9-81ED-4DB2-BD59-A6C34878D82A}">
-                    <a16:rowId xmlns="" xmlns:a16="http://schemas.microsoft.com/office/drawing/2014/main" val="10014"/>
+                    <a16:rowId xmlns:a16="http://schemas.microsoft.com/office/drawing/2014/main" xmlns="" val="10014"/>
                   </a:ext>
                 </a:extLst>
               </a:tr>
@@ -31640,7 +31773,7 @@
           <p:cNvPr id="7" name="Rectangle 6">
             <a:extLst>
               <a:ext uri="{FF2B5EF4-FFF2-40B4-BE49-F238E27FC236}">
-                <a16:creationId xmlns="" xmlns:a16="http://schemas.microsoft.com/office/drawing/2014/main" id="{DA565744-9D50-48B2-81A3-38E89C70EFC9}"/>
+                <a16:creationId xmlns:a16="http://schemas.microsoft.com/office/drawing/2014/main" xmlns="" id="{DA565744-9D50-48B2-81A3-38E89C70EFC9}"/>
               </a:ext>
             </a:extLst>
           </p:cNvPr>
@@ -31999,7 +32132,7 @@
           <p:cNvPr id="5" name="Content Placeholder 4">
             <a:extLst>
               <a:ext uri="{FF2B5EF4-FFF2-40B4-BE49-F238E27FC236}">
-                <a16:creationId xmlns="" xmlns:mc="http://schemas.openxmlformats.org/markup-compatibility/2006" xmlns:a14="http://schemas.microsoft.com/office/drawing/2010/main" xmlns:a16="http://schemas.microsoft.com/office/drawing/2014/main" id="{F9C3BF09-CB2F-40F5-9AA2-8E4DE3718EBD}"/>
+                <a16:creationId xmlns:a16="http://schemas.microsoft.com/office/drawing/2014/main" xmlns:a14="http://schemas.microsoft.com/office/drawing/2010/main" xmlns:mc="http://schemas.openxmlformats.org/markup-compatibility/2006" xmlns="" id="{F9C3BF09-CB2F-40F5-9AA2-8E4DE3718EBD}"/>
               </a:ext>
             </a:extLst>
           </p:cNvPr>
@@ -32035,7 +32168,7 @@
           <p:cNvPr id="6" name="Text Placeholder 5">
             <a:extLst>
               <a:ext uri="{FF2B5EF4-FFF2-40B4-BE49-F238E27FC236}">
-                <a16:creationId xmlns="" xmlns:a16="http://schemas.microsoft.com/office/drawing/2014/main" id="{FA1BBC8D-F7B7-4CD9-AD09-92912B8A557D}"/>
+                <a16:creationId xmlns:a16="http://schemas.microsoft.com/office/drawing/2014/main" xmlns="" id="{FA1BBC8D-F7B7-4CD9-AD09-92912B8A557D}"/>
               </a:ext>
             </a:extLst>
           </p:cNvPr>
@@ -32060,7 +32193,7 @@
           <p:cNvPr id="7" name="Text Placeholder 6">
             <a:extLst>
               <a:ext uri="{FF2B5EF4-FFF2-40B4-BE49-F238E27FC236}">
-                <a16:creationId xmlns="" xmlns:a16="http://schemas.microsoft.com/office/drawing/2014/main" id="{082BF48F-D726-4FDB-8699-D30050FBE57F}"/>
+                <a16:creationId xmlns:a16="http://schemas.microsoft.com/office/drawing/2014/main" xmlns="" id="{082BF48F-D726-4FDB-8699-D30050FBE57F}"/>
               </a:ext>
             </a:extLst>
           </p:cNvPr>
@@ -32161,7 +32294,6 @@
               <a:rPr lang="en-US" dirty="0"/>
               <a:t>?</a:t>
             </a:r>
-            <a:endParaRPr lang="en-US" dirty="0"/>
           </a:p>
         </p:txBody>
       </p:sp>
@@ -35519,49 +35651,28 @@
 </file>
 
 <file path=customXml/item1.xml><?xml version="1.0" encoding="utf-8"?>
-<?mso-contentType ?>
-<spe:Receivers xmlns:spe="http://schemas.microsoft.com/sharepoint/events">
-  <Receiver>
-    <Name>Document ID Generator</Name>
-    <Synchronization>Synchronous</Synchronization>
-    <Type>10001</Type>
-    <SequenceNumber>1000</SequenceNumber>
-    <Assembly>Microsoft.Office.DocumentManagement, Version=14.0.0.0, Culture=neutral, PublicKeyToken=71e9bce111e9429c</Assembly>
-    <Class>Microsoft.Office.DocumentManagement.Internal.DocIdHandler</Class>
-    <Data/>
-    <Filter/>
-  </Receiver>
-  <Receiver>
-    <Name>Document ID Generator</Name>
-    <Synchronization>Synchronous</Synchronization>
-    <Type>10002</Type>
-    <SequenceNumber>1001</SequenceNumber>
-    <Assembly>Microsoft.Office.DocumentManagement, Version=14.0.0.0, Culture=neutral, PublicKeyToken=71e9bce111e9429c</Assembly>
-    <Class>Microsoft.Office.DocumentManagement.Internal.DocIdHandler</Class>
-    <Data/>
-    <Filter/>
-  </Receiver>
-  <Receiver>
-    <Name>Document ID Generator</Name>
-    <Synchronization>Synchronous</Synchronization>
-    <Type>10004</Type>
-    <SequenceNumber>1002</SequenceNumber>
-    <Assembly>Microsoft.Office.DocumentManagement, Version=14.0.0.0, Culture=neutral, PublicKeyToken=71e9bce111e9429c</Assembly>
-    <Class>Microsoft.Office.DocumentManagement.Internal.DocIdHandler</Class>
-    <Data/>
-    <Filter/>
-  </Receiver>
-  <Receiver>
-    <Name>Document ID Generator</Name>
-    <Synchronization>Synchronous</Synchronization>
-    <Type>10006</Type>
-    <SequenceNumber>1003</SequenceNumber>
-    <Assembly>Microsoft.Office.DocumentManagement, Version=14.0.0.0, Culture=neutral, PublicKeyToken=71e9bce111e9429c</Assembly>
-    <Class>Microsoft.Office.DocumentManagement.Internal.DocIdHandler</Class>
-    <Data/>
-    <Filter/>
-  </Receiver>
-</spe:Receivers>
+<p:properties xmlns:p="http://schemas.microsoft.com/office/2006/metadata/properties" xmlns:xsi="http://www.w3.org/2001/XMLSchema-instance" xmlns:pc="http://schemas.microsoft.com/office/infopath/2007/PartnerControls">
+  <documentManagement>
+    <_dlc_DocId xmlns="8e8c147c-4a44-4efb-abf1-e3af25080dca">NYTQRMT4MAHZ-1-73408</_dlc_DocId>
+    <_dlc_DocIdUrl xmlns="8e8c147c-4a44-4efb-abf1-e3af25080dca">
+      <Url>http://eportal.education2020.com/Curriculum/CMath/_layouts/DocIdRedir.aspx?ID=NYTQRMT4MAHZ-1-73408</Url>
+      <Description>NYTQRMT4MAHZ-1-73408</Description>
+    </_dlc_DocIdUrl>
+    <Target_x0020_Audiences xmlns="e488ce5d-f489-49a9-8091-c8b3fdc3ce56" xsi:nil="true"/>
+    <Order0 xmlns="e488ce5d-f489-49a9-8091-c8b3fdc3ce56" xsi:nil="true"/>
+    <TaxCatchAll xmlns="8e8c147c-4a44-4efb-abf1-e3af25080dca">
+      <Value>7432</Value>
+    </TaxCatchAll>
+    <TaxKeywordTaxHTField xmlns="8e8c147c-4a44-4efb-abf1-e3af25080dca">
+      <Terms xmlns="http://schemas.microsoft.com/office/infopath/2007/PartnerControls">
+        <TermInfo xmlns="http://schemas.microsoft.com/office/infopath/2007/PartnerControls">
+          <TermName xmlns="http://schemas.microsoft.com/office/infopath/2007/PartnerControls">Lesson Shell</TermName>
+          <TermId xmlns="http://schemas.microsoft.com/office/infopath/2007/PartnerControls">7b823159-1b76-4161-b004-4b1e873e8ffe</TermId>
+        </TermInfo>
+      </Terms>
+    </TaxKeywordTaxHTField>
+  </documentManagement>
+</p:properties>
 </file>
 
 <file path=customXml/item2.xml><?xml version="1.0" encoding="utf-8"?>
@@ -35749,28 +35860,49 @@
 </file>
 
 <file path=customXml/item3.xml><?xml version="1.0" encoding="utf-8"?>
-<p:properties xmlns:p="http://schemas.microsoft.com/office/2006/metadata/properties" xmlns:xsi="http://www.w3.org/2001/XMLSchema-instance" xmlns:pc="http://schemas.microsoft.com/office/infopath/2007/PartnerControls">
-  <documentManagement>
-    <_dlc_DocId xmlns="8e8c147c-4a44-4efb-abf1-e3af25080dca">NYTQRMT4MAHZ-1-73408</_dlc_DocId>
-    <_dlc_DocIdUrl xmlns="8e8c147c-4a44-4efb-abf1-e3af25080dca">
-      <Url>http://eportal.education2020.com/Curriculum/CMath/_layouts/DocIdRedir.aspx?ID=NYTQRMT4MAHZ-1-73408</Url>
-      <Description>NYTQRMT4MAHZ-1-73408</Description>
-    </_dlc_DocIdUrl>
-    <Target_x0020_Audiences xmlns="e488ce5d-f489-49a9-8091-c8b3fdc3ce56" xsi:nil="true"/>
-    <Order0 xmlns="e488ce5d-f489-49a9-8091-c8b3fdc3ce56" xsi:nil="true"/>
-    <TaxCatchAll xmlns="8e8c147c-4a44-4efb-abf1-e3af25080dca">
-      <Value>7432</Value>
-    </TaxCatchAll>
-    <TaxKeywordTaxHTField xmlns="8e8c147c-4a44-4efb-abf1-e3af25080dca">
-      <Terms xmlns="http://schemas.microsoft.com/office/infopath/2007/PartnerControls">
-        <TermInfo xmlns="http://schemas.microsoft.com/office/infopath/2007/PartnerControls">
-          <TermName xmlns="http://schemas.microsoft.com/office/infopath/2007/PartnerControls">Lesson Shell</TermName>
-          <TermId xmlns="http://schemas.microsoft.com/office/infopath/2007/PartnerControls">7b823159-1b76-4161-b004-4b1e873e8ffe</TermId>
-        </TermInfo>
-      </Terms>
-    </TaxKeywordTaxHTField>
-  </documentManagement>
-</p:properties>
+<?mso-contentType ?>
+<spe:Receivers xmlns:spe="http://schemas.microsoft.com/sharepoint/events">
+  <Receiver>
+    <Name>Document ID Generator</Name>
+    <Synchronization>Synchronous</Synchronization>
+    <Type>10001</Type>
+    <SequenceNumber>1000</SequenceNumber>
+    <Assembly>Microsoft.Office.DocumentManagement, Version=14.0.0.0, Culture=neutral, PublicKeyToken=71e9bce111e9429c</Assembly>
+    <Class>Microsoft.Office.DocumentManagement.Internal.DocIdHandler</Class>
+    <Data/>
+    <Filter/>
+  </Receiver>
+  <Receiver>
+    <Name>Document ID Generator</Name>
+    <Synchronization>Synchronous</Synchronization>
+    <Type>10002</Type>
+    <SequenceNumber>1001</SequenceNumber>
+    <Assembly>Microsoft.Office.DocumentManagement, Version=14.0.0.0, Culture=neutral, PublicKeyToken=71e9bce111e9429c</Assembly>
+    <Class>Microsoft.Office.DocumentManagement.Internal.DocIdHandler</Class>
+    <Data/>
+    <Filter/>
+  </Receiver>
+  <Receiver>
+    <Name>Document ID Generator</Name>
+    <Synchronization>Synchronous</Synchronization>
+    <Type>10004</Type>
+    <SequenceNumber>1002</SequenceNumber>
+    <Assembly>Microsoft.Office.DocumentManagement, Version=14.0.0.0, Culture=neutral, PublicKeyToken=71e9bce111e9429c</Assembly>
+    <Class>Microsoft.Office.DocumentManagement.Internal.DocIdHandler</Class>
+    <Data/>
+    <Filter/>
+  </Receiver>
+  <Receiver>
+    <Name>Document ID Generator</Name>
+    <Synchronization>Synchronous</Synchronization>
+    <Type>10006</Type>
+    <SequenceNumber>1003</SequenceNumber>
+    <Assembly>Microsoft.Office.DocumentManagement, Version=14.0.0.0, Culture=neutral, PublicKeyToken=71e9bce111e9429c</Assembly>
+    <Class>Microsoft.Office.DocumentManagement.Internal.DocIdHandler</Class>
+    <Data/>
+    <Filter/>
+  </Receiver>
+</spe:Receivers>
 </file>
 
 <file path=customXml/item4.xml><?xml version="1.0" encoding="utf-8"?>
@@ -35783,10 +35915,18 @@
 </file>
 
 <file path=customXml/itemProps1.xml><?xml version="1.0" encoding="utf-8"?>
-<ds:datastoreItem xmlns:ds="http://schemas.openxmlformats.org/officeDocument/2006/customXml" ds:itemID="{1EECF812-387C-4DE4-B9A3-9F7A72D3EC4A}">
+<ds:datastoreItem xmlns:ds="http://schemas.openxmlformats.org/officeDocument/2006/customXml" ds:itemID="{05D38530-3CCC-436F-BB00-72BDEC3E8657}">
   <ds:schemaRefs>
-    <ds:schemaRef ds:uri="http://schemas.microsoft.com/sharepoint/events"/>
-    <ds:schemaRef ds:uri="http://www.w3.org/2000/xmlns/"/>
+    <ds:schemaRef ds:uri="e488ce5d-f489-49a9-8091-c8b3fdc3ce56"/>
+    <ds:schemaRef ds:uri="8e8c147c-4a44-4efb-abf1-e3af25080dca"/>
+    <ds:schemaRef ds:uri="http://schemas.microsoft.com/office/2006/documentManagement/types"/>
+    <ds:schemaRef ds:uri="http://schemas.microsoft.com/office/2006/metadata/properties"/>
+    <ds:schemaRef ds:uri="http://schemas.microsoft.com/office/infopath/2007/PartnerControls"/>
+    <ds:schemaRef ds:uri="http://www.w3.org/XML/1998/namespace"/>
+    <ds:schemaRef ds:uri="http://purl.org/dc/dcmitype/"/>
+    <ds:schemaRef ds:uri="http://purl.org/dc/terms/"/>
+    <ds:schemaRef ds:uri="http://purl.org/dc/elements/1.1/"/>
+    <ds:schemaRef ds:uri="http://schemas.openxmlformats.org/package/2006/metadata/core-properties"/>
   </ds:schemaRefs>
 </ds:datastoreItem>
 </file>
@@ -35812,18 +35952,10 @@
 </file>
 
 <file path=customXml/itemProps3.xml><?xml version="1.0" encoding="utf-8"?>
-<ds:datastoreItem xmlns:ds="http://schemas.openxmlformats.org/officeDocument/2006/customXml" ds:itemID="{05D38530-3CCC-436F-BB00-72BDEC3E8657}">
+<ds:datastoreItem xmlns:ds="http://schemas.openxmlformats.org/officeDocument/2006/customXml" ds:itemID="{1EECF812-387C-4DE4-B9A3-9F7A72D3EC4A}">
   <ds:schemaRefs>
-    <ds:schemaRef ds:uri="e488ce5d-f489-49a9-8091-c8b3fdc3ce56"/>
-    <ds:schemaRef ds:uri="8e8c147c-4a44-4efb-abf1-e3af25080dca"/>
-    <ds:schemaRef ds:uri="http://schemas.microsoft.com/office/2006/documentManagement/types"/>
-    <ds:schemaRef ds:uri="http://schemas.microsoft.com/office/2006/metadata/properties"/>
-    <ds:schemaRef ds:uri="http://schemas.microsoft.com/office/infopath/2007/PartnerControls"/>
-    <ds:schemaRef ds:uri="http://www.w3.org/XML/1998/namespace"/>
-    <ds:schemaRef ds:uri="http://purl.org/dc/dcmitype/"/>
-    <ds:schemaRef ds:uri="http://purl.org/dc/terms/"/>
-    <ds:schemaRef ds:uri="http://purl.org/dc/elements/1.1/"/>
-    <ds:schemaRef ds:uri="http://schemas.openxmlformats.org/package/2006/metadata/core-properties"/>
+    <ds:schemaRef ds:uri="http://schemas.microsoft.com/sharepoint/events"/>
+    <ds:schemaRef ds:uri="http://www.w3.org/2000/xmlns/"/>
   </ds:schemaRefs>
 </ds:datastoreItem>
 </file>

</xml_diff>